<commit_message>
SCRUM-10 conclui o gitignore e o README.md com boas práticas #done
</commit_message>
<xml_diff>
--- a/Modelando um Site de Sindicato.pptx
+++ b/Modelando um Site de Sindicato.pptx
@@ -52,6 +52,9 @@
     <p:sldId id="303" r:id="rId46"/>
     <p:sldId id="301" r:id="rId47"/>
     <p:sldId id="305" r:id="rId48"/>
+    <p:sldId id="306" r:id="rId49"/>
+    <p:sldId id="307" r:id="rId50"/>
+    <p:sldId id="308" r:id="rId51"/>
   </p:sldIdLst>
   <p:sldSz cx="12192000" cy="6858000"/>
   <p:notesSz cx="6858000" cy="9144000"/>
@@ -305,7 +308,7 @@
           <a:p>
             <a:fld id="{F580E494-B741-4394-AFC2-9A4DBC08C526}" type="datetimeFigureOut">
               <a:rPr lang="pt-BR" smtClean="0"/>
-              <a:t>16/10/2025</a:t>
+              <a:t>17/10/2025</a:t>
             </a:fld>
             <a:endParaRPr lang="pt-BR"/>
           </a:p>
@@ -503,7 +506,7 @@
           <a:p>
             <a:fld id="{F580E494-B741-4394-AFC2-9A4DBC08C526}" type="datetimeFigureOut">
               <a:rPr lang="pt-BR" smtClean="0"/>
-              <a:t>16/10/2025</a:t>
+              <a:t>17/10/2025</a:t>
             </a:fld>
             <a:endParaRPr lang="pt-BR"/>
           </a:p>
@@ -711,7 +714,7 @@
           <a:p>
             <a:fld id="{F580E494-B741-4394-AFC2-9A4DBC08C526}" type="datetimeFigureOut">
               <a:rPr lang="pt-BR" smtClean="0"/>
-              <a:t>16/10/2025</a:t>
+              <a:t>17/10/2025</a:t>
             </a:fld>
             <a:endParaRPr lang="pt-BR"/>
           </a:p>
@@ -909,7 +912,7 @@
           <a:p>
             <a:fld id="{F580E494-B741-4394-AFC2-9A4DBC08C526}" type="datetimeFigureOut">
               <a:rPr lang="pt-BR" smtClean="0"/>
-              <a:t>16/10/2025</a:t>
+              <a:t>17/10/2025</a:t>
             </a:fld>
             <a:endParaRPr lang="pt-BR"/>
           </a:p>
@@ -1184,7 +1187,7 @@
           <a:p>
             <a:fld id="{F580E494-B741-4394-AFC2-9A4DBC08C526}" type="datetimeFigureOut">
               <a:rPr lang="pt-BR" smtClean="0"/>
-              <a:t>16/10/2025</a:t>
+              <a:t>17/10/2025</a:t>
             </a:fld>
             <a:endParaRPr lang="pt-BR"/>
           </a:p>
@@ -1449,7 +1452,7 @@
           <a:p>
             <a:fld id="{F580E494-B741-4394-AFC2-9A4DBC08C526}" type="datetimeFigureOut">
               <a:rPr lang="pt-BR" smtClean="0"/>
-              <a:t>16/10/2025</a:t>
+              <a:t>17/10/2025</a:t>
             </a:fld>
             <a:endParaRPr lang="pt-BR"/>
           </a:p>
@@ -1861,7 +1864,7 @@
           <a:p>
             <a:fld id="{F580E494-B741-4394-AFC2-9A4DBC08C526}" type="datetimeFigureOut">
               <a:rPr lang="pt-BR" smtClean="0"/>
-              <a:t>16/10/2025</a:t>
+              <a:t>17/10/2025</a:t>
             </a:fld>
             <a:endParaRPr lang="pt-BR"/>
           </a:p>
@@ -2002,7 +2005,7 @@
           <a:p>
             <a:fld id="{F580E494-B741-4394-AFC2-9A4DBC08C526}" type="datetimeFigureOut">
               <a:rPr lang="pt-BR" smtClean="0"/>
-              <a:t>16/10/2025</a:t>
+              <a:t>17/10/2025</a:t>
             </a:fld>
             <a:endParaRPr lang="pt-BR"/>
           </a:p>
@@ -2115,7 +2118,7 @@
           <a:p>
             <a:fld id="{F580E494-B741-4394-AFC2-9A4DBC08C526}" type="datetimeFigureOut">
               <a:rPr lang="pt-BR" smtClean="0"/>
-              <a:t>16/10/2025</a:t>
+              <a:t>17/10/2025</a:t>
             </a:fld>
             <a:endParaRPr lang="pt-BR"/>
           </a:p>
@@ -2426,7 +2429,7 @@
           <a:p>
             <a:fld id="{F580E494-B741-4394-AFC2-9A4DBC08C526}" type="datetimeFigureOut">
               <a:rPr lang="pt-BR" smtClean="0"/>
-              <a:t>16/10/2025</a:t>
+              <a:t>17/10/2025</a:t>
             </a:fld>
             <a:endParaRPr lang="pt-BR"/>
           </a:p>
@@ -2714,7 +2717,7 @@
           <a:p>
             <a:fld id="{F580E494-B741-4394-AFC2-9A4DBC08C526}" type="datetimeFigureOut">
               <a:rPr lang="pt-BR" smtClean="0"/>
-              <a:t>16/10/2025</a:t>
+              <a:t>17/10/2025</a:t>
             </a:fld>
             <a:endParaRPr lang="pt-BR"/>
           </a:p>
@@ -2955,7 +2958,7 @@
           <a:p>
             <a:fld id="{F580E494-B741-4394-AFC2-9A4DBC08C526}" type="datetimeFigureOut">
               <a:rPr lang="pt-BR" smtClean="0"/>
-              <a:t>16/10/2025</a:t>
+              <a:t>17/10/2025</a:t>
             </a:fld>
             <a:endParaRPr lang="pt-BR"/>
           </a:p>
@@ -7154,6 +7157,686 @@
 </p:sld>
 </file>
 
+<file path=ppt/slides/slide48.xml><?xml version="1.0" encoding="utf-8"?>
+<p:sld xmlns:a="http://schemas.openxmlformats.org/drawingml/2006/main" xmlns:r="http://schemas.openxmlformats.org/officeDocument/2006/relationships" xmlns:p="http://schemas.openxmlformats.org/presentationml/2006/main">
+  <p:cSld>
+    <p:spTree>
+      <p:nvGrpSpPr>
+        <p:cNvPr id="1" name=""/>
+        <p:cNvGrpSpPr/>
+        <p:nvPr/>
+      </p:nvGrpSpPr>
+      <p:grpSpPr>
+        <a:xfrm>
+          <a:off x="0" y="0"/>
+          <a:ext cx="0" cy="0"/>
+          <a:chOff x="0" y="0"/>
+          <a:chExt cx="0" cy="0"/>
+        </a:xfrm>
+      </p:grpSpPr>
+      <p:pic>
+        <p:nvPicPr>
+          <p:cNvPr id="2" name="Imagem 1">
+            <a:extLst>
+              <a:ext uri="{FF2B5EF4-FFF2-40B4-BE49-F238E27FC236}">
+                <a16:creationId xmlns:a16="http://schemas.microsoft.com/office/drawing/2014/main" id="{420F9AD6-5F70-41FF-8583-BD066C0A91F5}"/>
+              </a:ext>
+            </a:extLst>
+          </p:cNvPr>
+          <p:cNvPicPr>
+            <a:picLocks noChangeAspect="1"/>
+          </p:cNvPicPr>
+          <p:nvPr/>
+        </p:nvPicPr>
+        <p:blipFill>
+          <a:blip r:embed="rId2"/>
+          <a:stretch>
+            <a:fillRect/>
+          </a:stretch>
+        </p:blipFill>
+        <p:spPr>
+          <a:xfrm>
+            <a:off x="0" y="2837801"/>
+            <a:ext cx="12192000" cy="1182397"/>
+          </a:xfrm>
+          <a:prstGeom prst="rect">
+            <a:avLst/>
+          </a:prstGeom>
+        </p:spPr>
+      </p:pic>
+    </p:spTree>
+    <p:extLst>
+      <p:ext uri="{BB962C8B-B14F-4D97-AF65-F5344CB8AC3E}">
+        <p14:creationId xmlns:p14="http://schemas.microsoft.com/office/powerpoint/2010/main" val="1863308514"/>
+      </p:ext>
+    </p:extLst>
+  </p:cSld>
+  <p:clrMapOvr>
+    <a:masterClrMapping/>
+  </p:clrMapOvr>
+</p:sld>
+</file>
+
+<file path=ppt/slides/slide49.xml><?xml version="1.0" encoding="utf-8"?>
+<p:sld xmlns:a="http://schemas.openxmlformats.org/drawingml/2006/main" xmlns:r="http://schemas.openxmlformats.org/officeDocument/2006/relationships" xmlns:p="http://schemas.openxmlformats.org/presentationml/2006/main">
+  <p:cSld>
+    <p:bg>
+      <p:bgPr>
+        <a:solidFill>
+          <a:schemeClr val="bg1"/>
+        </a:solidFill>
+        <a:effectLst/>
+      </p:bgPr>
+    </p:bg>
+    <p:spTree>
+      <p:nvGrpSpPr>
+        <p:cNvPr id="1" name=""/>
+        <p:cNvGrpSpPr/>
+        <p:nvPr/>
+      </p:nvGrpSpPr>
+      <p:grpSpPr>
+        <a:xfrm>
+          <a:off x="0" y="0"/>
+          <a:ext cx="0" cy="0"/>
+          <a:chOff x="0" y="0"/>
+          <a:chExt cx="0" cy="0"/>
+        </a:xfrm>
+      </p:grpSpPr>
+      <p:sp>
+        <p:nvSpPr>
+          <p:cNvPr id="7" name="Rectangle 6">
+            <a:extLst>
+              <a:ext uri="{FF2B5EF4-FFF2-40B4-BE49-F238E27FC236}">
+                <a16:creationId xmlns:a16="http://schemas.microsoft.com/office/drawing/2014/main" id="{F3060C83-F051-4F0E-ABAD-AA0DFC48B218}"/>
+              </a:ext>
+              <a:ext uri="{C183D7F6-B498-43B3-948B-1728B52AA6E4}">
+                <adec:decorative xmlns:adec="http://schemas.microsoft.com/office/drawing/2017/decorative" val="1"/>
+              </a:ext>
+            </a:extLst>
+          </p:cNvPr>
+          <p:cNvSpPr>
+            <a:spLocks noGrp="1" noRot="1" noChangeAspect="1" noMove="1" noResize="1" noEditPoints="1" noAdjustHandles="1" noChangeArrowheads="1" noChangeShapeType="1" noTextEdit="1"/>
+          </p:cNvSpPr>
+          <p:nvPr>
+            <p:extLst>
+              <p:ext uri="{386F3935-93C4-4BCD-93E2-E3B085C9AB24}">
+                <p16:designElem xmlns:p16="http://schemas.microsoft.com/office/powerpoint/2015/main" val="1"/>
+              </p:ext>
+            </p:extLst>
+          </p:nvPr>
+        </p:nvSpPr>
+        <p:spPr>
+          <a:xfrm>
+            <a:off x="0" y="0"/>
+            <a:ext cx="12192000" cy="6858000"/>
+          </a:xfrm>
+          <a:prstGeom prst="rect">
+            <a:avLst/>
+          </a:prstGeom>
+          <a:solidFill>
+            <a:schemeClr val="bg1"/>
+          </a:solidFill>
+          <a:ln>
+            <a:noFill/>
+          </a:ln>
+        </p:spPr>
+        <p:style>
+          <a:lnRef idx="2">
+            <a:schemeClr val="accent1">
+              <a:shade val="50000"/>
+            </a:schemeClr>
+          </a:lnRef>
+          <a:fillRef idx="1">
+            <a:schemeClr val="accent1"/>
+          </a:fillRef>
+          <a:effectRef idx="0">
+            <a:schemeClr val="accent1"/>
+          </a:effectRef>
+          <a:fontRef idx="minor">
+            <a:schemeClr val="lt1"/>
+          </a:fontRef>
+        </p:style>
+        <p:txBody>
+          <a:bodyPr rtlCol="0" anchor="ctr"/>
+          <a:lstStyle/>
+          <a:p>
+            <a:pPr algn="ctr"/>
+            <a:endParaRPr lang="en-US" dirty="0"/>
+          </a:p>
+        </p:txBody>
+      </p:sp>
+      <p:sp>
+        <p:nvSpPr>
+          <p:cNvPr id="9" name="Freeform: Shape 8">
+            <a:extLst>
+              <a:ext uri="{FF2B5EF4-FFF2-40B4-BE49-F238E27FC236}">
+                <a16:creationId xmlns:a16="http://schemas.microsoft.com/office/drawing/2014/main" id="{83C98ABE-055B-441F-B07E-44F97F083C39}"/>
+              </a:ext>
+              <a:ext uri="{C183D7F6-B498-43B3-948B-1728B52AA6E4}">
+                <adec:decorative xmlns:adec="http://schemas.microsoft.com/office/drawing/2017/decorative" val="1"/>
+              </a:ext>
+            </a:extLst>
+          </p:cNvPr>
+          <p:cNvSpPr>
+            <a:spLocks noGrp="1" noRot="1" noChangeAspect="1" noMove="1" noResize="1" noEditPoints="1" noAdjustHandles="1" noChangeArrowheads="1" noChangeShapeType="1" noTextEdit="1"/>
+          </p:cNvSpPr>
+          <p:nvPr>
+            <p:extLst>
+              <p:ext uri="{386F3935-93C4-4BCD-93E2-E3B085C9AB24}">
+                <p16:designElem xmlns:p16="http://schemas.microsoft.com/office/powerpoint/2015/main" val="1"/>
+              </p:ext>
+            </p:extLst>
+          </p:nvPr>
+        </p:nvSpPr>
+        <p:spPr>
+          <a:xfrm rot="18900000" flipH="1">
+            <a:off x="-376156" y="-253670"/>
+            <a:ext cx="1827638" cy="1376989"/>
+          </a:xfrm>
+          <a:custGeom>
+            <a:avLst/>
+            <a:gdLst>
+              <a:gd name="connsiteX0" fmla="*/ 0 w 1827638"/>
+              <a:gd name="connsiteY0" fmla="*/ 987379 h 1376989"/>
+              <a:gd name="connsiteX1" fmla="*/ 987379 w 1827638"/>
+              <a:gd name="connsiteY1" fmla="*/ 0 h 1376989"/>
+              <a:gd name="connsiteX2" fmla="*/ 1827638 w 1827638"/>
+              <a:gd name="connsiteY2" fmla="*/ 840260 h 1376989"/>
+              <a:gd name="connsiteX3" fmla="*/ 1827638 w 1827638"/>
+              <a:gd name="connsiteY3" fmla="*/ 1376989 h 1376989"/>
+              <a:gd name="connsiteX4" fmla="*/ 0 w 1827638"/>
+              <a:gd name="connsiteY4" fmla="*/ 1376989 h 1376989"/>
+            </a:gdLst>
+            <a:ahLst/>
+            <a:cxnLst>
+              <a:cxn ang="0">
+                <a:pos x="connsiteX0" y="connsiteY0"/>
+              </a:cxn>
+              <a:cxn ang="0">
+                <a:pos x="connsiteX1" y="connsiteY1"/>
+              </a:cxn>
+              <a:cxn ang="0">
+                <a:pos x="connsiteX2" y="connsiteY2"/>
+              </a:cxn>
+              <a:cxn ang="0">
+                <a:pos x="connsiteX3" y="connsiteY3"/>
+              </a:cxn>
+              <a:cxn ang="0">
+                <a:pos x="connsiteX4" y="connsiteY4"/>
+              </a:cxn>
+            </a:cxnLst>
+            <a:rect l="l" t="t" r="r" b="b"/>
+            <a:pathLst>
+              <a:path w="1827638" h="1376989">
+                <a:moveTo>
+                  <a:pt x="0" y="987379"/>
+                </a:moveTo>
+                <a:lnTo>
+                  <a:pt x="987379" y="0"/>
+                </a:lnTo>
+                <a:lnTo>
+                  <a:pt x="1827638" y="840260"/>
+                </a:lnTo>
+                <a:lnTo>
+                  <a:pt x="1827638" y="1376989"/>
+                </a:lnTo>
+                <a:lnTo>
+                  <a:pt x="0" y="1376989"/>
+                </a:lnTo>
+                <a:close/>
+              </a:path>
+            </a:pathLst>
+          </a:custGeom>
+          <a:solidFill>
+            <a:schemeClr val="accent1">
+              <a:alpha val="30000"/>
+            </a:schemeClr>
+          </a:solidFill>
+          <a:ln>
+            <a:noFill/>
+          </a:ln>
+        </p:spPr>
+        <p:style>
+          <a:lnRef idx="2">
+            <a:schemeClr val="accent1">
+              <a:shade val="50000"/>
+            </a:schemeClr>
+          </a:lnRef>
+          <a:fillRef idx="1">
+            <a:schemeClr val="accent1"/>
+          </a:fillRef>
+          <a:effectRef idx="0">
+            <a:schemeClr val="accent1"/>
+          </a:effectRef>
+          <a:fontRef idx="minor">
+            <a:schemeClr val="lt1"/>
+          </a:fontRef>
+        </p:style>
+        <p:txBody>
+          <a:bodyPr rtlCol="0" anchor="ctr"/>
+          <a:lstStyle/>
+          <a:p>
+            <a:pPr algn="ctr"/>
+            <a:endParaRPr lang="en-US" dirty="0"/>
+          </a:p>
+        </p:txBody>
+      </p:sp>
+      <p:sp>
+        <p:nvSpPr>
+          <p:cNvPr id="11" name="Rectangle 10">
+            <a:extLst>
+              <a:ext uri="{FF2B5EF4-FFF2-40B4-BE49-F238E27FC236}">
+                <a16:creationId xmlns:a16="http://schemas.microsoft.com/office/drawing/2014/main" id="{29FDB030-9B49-4CED-8CCD-4D99382388AC}"/>
+              </a:ext>
+              <a:ext uri="{C183D7F6-B498-43B3-948B-1728B52AA6E4}">
+                <adec:decorative xmlns:adec="http://schemas.microsoft.com/office/drawing/2017/decorative" val="1"/>
+              </a:ext>
+            </a:extLst>
+          </p:cNvPr>
+          <p:cNvSpPr>
+            <a:spLocks noGrp="1" noRot="1" noChangeAspect="1" noMove="1" noResize="1" noEditPoints="1" noAdjustHandles="1" noChangeArrowheads="1" noChangeShapeType="1" noTextEdit="1"/>
+          </p:cNvSpPr>
+          <p:nvPr>
+            <p:extLst>
+              <p:ext uri="{386F3935-93C4-4BCD-93E2-E3B085C9AB24}">
+                <p16:designElem xmlns:p16="http://schemas.microsoft.com/office/powerpoint/2015/main" val="1"/>
+              </p:ext>
+            </p:extLst>
+          </p:nvPr>
+        </p:nvSpPr>
+        <p:spPr>
+          <a:xfrm rot="18900000" flipH="1">
+            <a:off x="891641" y="422146"/>
+            <a:ext cx="645368" cy="645368"/>
+          </a:xfrm>
+          <a:prstGeom prst="rect">
+            <a:avLst/>
+          </a:prstGeom>
+          <a:solidFill>
+            <a:schemeClr val="accent1">
+              <a:alpha val="30000"/>
+            </a:schemeClr>
+          </a:solidFill>
+          <a:ln>
+            <a:noFill/>
+          </a:ln>
+        </p:spPr>
+        <p:style>
+          <a:lnRef idx="2">
+            <a:schemeClr val="accent1">
+              <a:shade val="50000"/>
+            </a:schemeClr>
+          </a:lnRef>
+          <a:fillRef idx="1">
+            <a:schemeClr val="accent1"/>
+          </a:fillRef>
+          <a:effectRef idx="0">
+            <a:schemeClr val="accent1"/>
+          </a:effectRef>
+          <a:fontRef idx="minor">
+            <a:schemeClr val="lt1"/>
+          </a:fontRef>
+        </p:style>
+        <p:txBody>
+          <a:bodyPr rtlCol="0" anchor="ctr"/>
+          <a:lstStyle/>
+          <a:p>
+            <a:pPr algn="ctr"/>
+            <a:endParaRPr lang="en-US"/>
+          </a:p>
+        </p:txBody>
+      </p:sp>
+      <p:sp>
+        <p:nvSpPr>
+          <p:cNvPr id="13" name="Rectangle 12">
+            <a:extLst>
+              <a:ext uri="{FF2B5EF4-FFF2-40B4-BE49-F238E27FC236}">
+                <a16:creationId xmlns:a16="http://schemas.microsoft.com/office/drawing/2014/main" id="{3783CA14-24A1-485C-8B30-D6A5D87987AD}"/>
+              </a:ext>
+              <a:ext uri="{C183D7F6-B498-43B3-948B-1728B52AA6E4}">
+                <adec:decorative xmlns:adec="http://schemas.microsoft.com/office/drawing/2017/decorative" val="1"/>
+              </a:ext>
+            </a:extLst>
+          </p:cNvPr>
+          <p:cNvSpPr>
+            <a:spLocks noGrp="1" noRot="1" noChangeAspect="1" noMove="1" noResize="1" noEditPoints="1" noAdjustHandles="1" noChangeArrowheads="1" noChangeShapeType="1" noTextEdit="1"/>
+          </p:cNvSpPr>
+          <p:nvPr>
+            <p:extLst>
+              <p:ext uri="{386F3935-93C4-4BCD-93E2-E3B085C9AB24}">
+                <p16:designElem xmlns:p16="http://schemas.microsoft.com/office/powerpoint/2015/main" val="1"/>
+              </p:ext>
+            </p:extLst>
+          </p:nvPr>
+        </p:nvSpPr>
+        <p:spPr>
+          <a:xfrm rot="18900000" flipH="1">
+            <a:off x="10043482" y="655140"/>
+            <a:ext cx="687472" cy="687472"/>
+          </a:xfrm>
+          <a:prstGeom prst="rect">
+            <a:avLst/>
+          </a:prstGeom>
+          <a:solidFill>
+            <a:schemeClr val="accent4">
+              <a:alpha val="30000"/>
+            </a:schemeClr>
+          </a:solidFill>
+          <a:ln>
+            <a:noFill/>
+          </a:ln>
+        </p:spPr>
+        <p:style>
+          <a:lnRef idx="2">
+            <a:schemeClr val="accent1">
+              <a:shade val="50000"/>
+            </a:schemeClr>
+          </a:lnRef>
+          <a:fillRef idx="1">
+            <a:schemeClr val="accent1"/>
+          </a:fillRef>
+          <a:effectRef idx="0">
+            <a:schemeClr val="accent1"/>
+          </a:effectRef>
+          <a:fontRef idx="minor">
+            <a:schemeClr val="lt1"/>
+          </a:fontRef>
+        </p:style>
+        <p:txBody>
+          <a:bodyPr rtlCol="0" anchor="ctr"/>
+          <a:lstStyle/>
+          <a:p>
+            <a:pPr algn="ctr"/>
+            <a:endParaRPr lang="en-US"/>
+          </a:p>
+        </p:txBody>
+      </p:sp>
+      <p:sp>
+        <p:nvSpPr>
+          <p:cNvPr id="15" name="Freeform: Shape 14">
+            <a:extLst>
+              <a:ext uri="{FF2B5EF4-FFF2-40B4-BE49-F238E27FC236}">
+                <a16:creationId xmlns:a16="http://schemas.microsoft.com/office/drawing/2014/main" id="{9A97C86A-04D6-40F7-AE84-31AB43E6A846}"/>
+              </a:ext>
+              <a:ext uri="{C183D7F6-B498-43B3-948B-1728B52AA6E4}">
+                <adec:decorative xmlns:adec="http://schemas.microsoft.com/office/drawing/2017/decorative" val="1"/>
+              </a:ext>
+            </a:extLst>
+          </p:cNvPr>
+          <p:cNvSpPr>
+            <a:spLocks noGrp="1" noRot="1" noChangeAspect="1" noMove="1" noResize="1" noEditPoints="1" noAdjustHandles="1" noChangeArrowheads="1" noChangeShapeType="1" noTextEdit="1"/>
+          </p:cNvSpPr>
+          <p:nvPr>
+            <p:extLst>
+              <p:ext uri="{386F3935-93C4-4BCD-93E2-E3B085C9AB24}">
+                <p16:designElem xmlns:p16="http://schemas.microsoft.com/office/powerpoint/2015/main" val="1"/>
+              </p:ext>
+            </p:extLst>
+          </p:nvPr>
+        </p:nvSpPr>
+        <p:spPr>
+          <a:xfrm rot="10800000" flipH="1">
+            <a:off x="9356643" y="0"/>
+            <a:ext cx="2835357" cy="1480837"/>
+          </a:xfrm>
+          <a:custGeom>
+            <a:avLst/>
+            <a:gdLst>
+              <a:gd name="connsiteX0" fmla="*/ 2835357 w 2835357"/>
+              <a:gd name="connsiteY0" fmla="*/ 1480837 h 1480837"/>
+              <a:gd name="connsiteX1" fmla="*/ 0 w 2835357"/>
+              <a:gd name="connsiteY1" fmla="*/ 1480837 h 1480837"/>
+              <a:gd name="connsiteX2" fmla="*/ 1552727 w 2835357"/>
+              <a:gd name="connsiteY2" fmla="*/ 0 h 1480837"/>
+              <a:gd name="connsiteX3" fmla="*/ 2835357 w 2835357"/>
+              <a:gd name="connsiteY3" fmla="*/ 1223245 h 1480837"/>
+            </a:gdLst>
+            <a:ahLst/>
+            <a:cxnLst>
+              <a:cxn ang="0">
+                <a:pos x="connsiteX0" y="connsiteY0"/>
+              </a:cxn>
+              <a:cxn ang="0">
+                <a:pos x="connsiteX1" y="connsiteY1"/>
+              </a:cxn>
+              <a:cxn ang="0">
+                <a:pos x="connsiteX2" y="connsiteY2"/>
+              </a:cxn>
+              <a:cxn ang="0">
+                <a:pos x="connsiteX3" y="connsiteY3"/>
+              </a:cxn>
+            </a:cxnLst>
+            <a:rect l="l" t="t" r="r" b="b"/>
+            <a:pathLst>
+              <a:path w="2835357" h="1480837">
+                <a:moveTo>
+                  <a:pt x="2835357" y="1480837"/>
+                </a:moveTo>
+                <a:lnTo>
+                  <a:pt x="0" y="1480837"/>
+                </a:lnTo>
+                <a:lnTo>
+                  <a:pt x="1552727" y="0"/>
+                </a:lnTo>
+                <a:lnTo>
+                  <a:pt x="2835357" y="1223245"/>
+                </a:lnTo>
+                <a:close/>
+              </a:path>
+            </a:pathLst>
+          </a:custGeom>
+          <a:solidFill>
+            <a:schemeClr val="accent4">
+              <a:alpha val="30000"/>
+            </a:schemeClr>
+          </a:solidFill>
+          <a:ln>
+            <a:noFill/>
+          </a:ln>
+        </p:spPr>
+        <p:style>
+          <a:lnRef idx="2">
+            <a:schemeClr val="accent1">
+              <a:shade val="50000"/>
+            </a:schemeClr>
+          </a:lnRef>
+          <a:fillRef idx="1">
+            <a:schemeClr val="accent1"/>
+          </a:fillRef>
+          <a:effectRef idx="0">
+            <a:schemeClr val="accent1"/>
+          </a:effectRef>
+          <a:fontRef idx="minor">
+            <a:schemeClr val="lt1"/>
+          </a:fontRef>
+        </p:style>
+        <p:txBody>
+          <a:bodyPr wrap="square" rtlCol="0" anchor="ctr">
+            <a:noAutofit/>
+          </a:bodyPr>
+          <a:lstStyle/>
+          <a:p>
+            <a:pPr algn="ctr"/>
+            <a:endParaRPr lang="en-US" dirty="0"/>
+          </a:p>
+        </p:txBody>
+      </p:sp>
+      <p:sp>
+        <p:nvSpPr>
+          <p:cNvPr id="17" name="Isosceles Triangle 16">
+            <a:extLst>
+              <a:ext uri="{FF2B5EF4-FFF2-40B4-BE49-F238E27FC236}">
+                <a16:creationId xmlns:a16="http://schemas.microsoft.com/office/drawing/2014/main" id="{FF9F2414-84E8-453E-B1F3-389FDE8192D9}"/>
+              </a:ext>
+              <a:ext uri="{C183D7F6-B498-43B3-948B-1728B52AA6E4}">
+                <adec:decorative xmlns:adec="http://schemas.microsoft.com/office/drawing/2017/decorative" val="1"/>
+              </a:ext>
+            </a:extLst>
+          </p:cNvPr>
+          <p:cNvSpPr>
+            <a:spLocks noGrp="1" noRot="1" noChangeAspect="1" noMove="1" noResize="1" noEditPoints="1" noAdjustHandles="1" noChangeArrowheads="1" noChangeShapeType="1" noTextEdit="1"/>
+          </p:cNvSpPr>
+          <p:nvPr>
+            <p:extLst>
+              <p:ext uri="{386F3935-93C4-4BCD-93E2-E3B085C9AB24}">
+                <p16:designElem xmlns:p16="http://schemas.microsoft.com/office/powerpoint/2015/main" val="1"/>
+              </p:ext>
+            </p:extLst>
+          </p:nvPr>
+        </p:nvSpPr>
+        <p:spPr>
+          <a:xfrm flipH="1">
+            <a:off x="7976344" y="6115501"/>
+            <a:ext cx="1494513" cy="742499"/>
+          </a:xfrm>
+          <a:prstGeom prst="triangle">
+            <a:avLst/>
+          </a:prstGeom>
+          <a:solidFill>
+            <a:schemeClr val="accent1">
+              <a:alpha val="30000"/>
+            </a:schemeClr>
+          </a:solidFill>
+          <a:ln>
+            <a:noFill/>
+          </a:ln>
+        </p:spPr>
+        <p:style>
+          <a:lnRef idx="2">
+            <a:schemeClr val="accent1">
+              <a:shade val="50000"/>
+            </a:schemeClr>
+          </a:lnRef>
+          <a:fillRef idx="1">
+            <a:schemeClr val="accent1"/>
+          </a:fillRef>
+          <a:effectRef idx="0">
+            <a:schemeClr val="accent1"/>
+          </a:effectRef>
+          <a:fontRef idx="minor">
+            <a:schemeClr val="lt1"/>
+          </a:fontRef>
+        </p:style>
+        <p:txBody>
+          <a:bodyPr rtlCol="0" anchor="ctr"/>
+          <a:lstStyle/>
+          <a:p>
+            <a:pPr algn="ctr"/>
+            <a:endParaRPr lang="en-US"/>
+          </a:p>
+        </p:txBody>
+      </p:sp>
+      <p:pic>
+        <p:nvPicPr>
+          <p:cNvPr id="2" name="Imagem 1">
+            <a:extLst>
+              <a:ext uri="{FF2B5EF4-FFF2-40B4-BE49-F238E27FC236}">
+                <a16:creationId xmlns:a16="http://schemas.microsoft.com/office/drawing/2014/main" id="{D81ECB59-BEAF-4CDB-AD4C-61026FE67A1E}"/>
+              </a:ext>
+            </a:extLst>
+          </p:cNvPr>
+          <p:cNvPicPr>
+            <a:picLocks noChangeAspect="1"/>
+          </p:cNvPicPr>
+          <p:nvPr/>
+        </p:nvPicPr>
+        <p:blipFill>
+          <a:blip r:embed="rId2"/>
+          <a:stretch>
+            <a:fillRect/>
+          </a:stretch>
+        </p:blipFill>
+        <p:spPr>
+          <a:xfrm>
+            <a:off x="643467" y="2202179"/>
+            <a:ext cx="10905066" cy="2453640"/>
+          </a:xfrm>
+          <a:prstGeom prst="rect">
+            <a:avLst/>
+          </a:prstGeom>
+          <a:ln>
+            <a:noFill/>
+          </a:ln>
+        </p:spPr>
+      </p:pic>
+      <p:sp>
+        <p:nvSpPr>
+          <p:cNvPr id="19" name="Isosceles Triangle 18">
+            <a:extLst>
+              <a:ext uri="{FF2B5EF4-FFF2-40B4-BE49-F238E27FC236}">
+                <a16:creationId xmlns:a16="http://schemas.microsoft.com/office/drawing/2014/main" id="{3ECA69A1-7536-43AC-85EF-C7106179F5ED}"/>
+              </a:ext>
+              <a:ext uri="{C183D7F6-B498-43B3-948B-1728B52AA6E4}">
+                <adec:decorative xmlns:adec="http://schemas.microsoft.com/office/drawing/2017/decorative" val="1"/>
+              </a:ext>
+            </a:extLst>
+          </p:cNvPr>
+          <p:cNvSpPr>
+            <a:spLocks noGrp="1" noRot="1" noChangeAspect="1" noMove="1" noResize="1" noEditPoints="1" noAdjustHandles="1" noChangeArrowheads="1" noChangeShapeType="1" noTextEdit="1"/>
+          </p:cNvSpPr>
+          <p:nvPr>
+            <p:extLst>
+              <p:ext uri="{386F3935-93C4-4BCD-93E2-E3B085C9AB24}">
+                <p16:designElem xmlns:p16="http://schemas.microsoft.com/office/powerpoint/2015/main" val="1"/>
+              </p:ext>
+            </p:extLst>
+          </p:nvPr>
+        </p:nvSpPr>
+        <p:spPr>
+          <a:xfrm flipH="1">
+            <a:off x="7604080" y="6453143"/>
+            <a:ext cx="814903" cy="404857"/>
+          </a:xfrm>
+          <a:prstGeom prst="triangle">
+            <a:avLst/>
+          </a:prstGeom>
+          <a:solidFill>
+            <a:schemeClr val="accent1">
+              <a:alpha val="30000"/>
+            </a:schemeClr>
+          </a:solidFill>
+          <a:ln>
+            <a:noFill/>
+          </a:ln>
+        </p:spPr>
+        <p:style>
+          <a:lnRef idx="2">
+            <a:schemeClr val="accent1">
+              <a:shade val="50000"/>
+            </a:schemeClr>
+          </a:lnRef>
+          <a:fillRef idx="1">
+            <a:schemeClr val="accent1"/>
+          </a:fillRef>
+          <a:effectRef idx="0">
+            <a:schemeClr val="accent1"/>
+          </a:effectRef>
+          <a:fontRef idx="minor">
+            <a:schemeClr val="lt1"/>
+          </a:fontRef>
+        </p:style>
+        <p:txBody>
+          <a:bodyPr rtlCol="0" anchor="ctr"/>
+          <a:lstStyle/>
+          <a:p>
+            <a:pPr algn="ctr"/>
+            <a:endParaRPr lang="en-US"/>
+          </a:p>
+        </p:txBody>
+      </p:sp>
+    </p:spTree>
+    <p:extLst>
+      <p:ext uri="{BB962C8B-B14F-4D97-AF65-F5344CB8AC3E}">
+        <p14:creationId xmlns:p14="http://schemas.microsoft.com/office/powerpoint/2010/main" val="898951563"/>
+      </p:ext>
+    </p:extLst>
+  </p:cSld>
+  <p:clrMapOvr>
+    <a:masterClrMapping/>
+  </p:clrMapOvr>
+</p:sld>
+</file>
+
 <file path=ppt/slides/slide5.xml><?xml version="1.0" encoding="utf-8"?>
 <p:sld xmlns:a="http://schemas.openxmlformats.org/drawingml/2006/main" xmlns:r="http://schemas.openxmlformats.org/officeDocument/2006/relationships" xmlns:p="http://schemas.openxmlformats.org/presentationml/2006/main">
   <p:cSld>
@@ -7307,6 +7990,36 @@
     <p:extLst>
       <p:ext uri="{BB962C8B-B14F-4D97-AF65-F5344CB8AC3E}">
         <p14:creationId xmlns:p14="http://schemas.microsoft.com/office/powerpoint/2010/main" val="1485472322"/>
+      </p:ext>
+    </p:extLst>
+  </p:cSld>
+  <p:clrMapOvr>
+    <a:masterClrMapping/>
+  </p:clrMapOvr>
+</p:sld>
+</file>
+
+<file path=ppt/slides/slide50.xml><?xml version="1.0" encoding="utf-8"?>
+<p:sld xmlns:a="http://schemas.openxmlformats.org/drawingml/2006/main" xmlns:r="http://schemas.openxmlformats.org/officeDocument/2006/relationships" xmlns:p="http://schemas.openxmlformats.org/presentationml/2006/main">
+  <p:cSld>
+    <p:spTree>
+      <p:nvGrpSpPr>
+        <p:cNvPr id="1" name=""/>
+        <p:cNvGrpSpPr/>
+        <p:nvPr/>
+      </p:nvGrpSpPr>
+      <p:grpSpPr>
+        <a:xfrm>
+          <a:off x="0" y="0"/>
+          <a:ext cx="0" cy="0"/>
+          <a:chOff x="0" y="0"/>
+          <a:chExt cx="0" cy="0"/>
+        </a:xfrm>
+      </p:grpSpPr>
+    </p:spTree>
+    <p:extLst>
+      <p:ext uri="{BB962C8B-B14F-4D97-AF65-F5344CB8AC3E}">
+        <p14:creationId xmlns:p14="http://schemas.microsoft.com/office/powerpoint/2010/main" val="1493292325"/>
       </p:ext>
     </p:extLst>
   </p:cSld>

</xml_diff>